<commit_message>
added ppx presentation + underlined best values in .xlsx
</commit_message>
<xml_diff>
--- a/documents/Presentation.pptx
+++ b/documents/Presentation.pptx
@@ -6,17 +6,17 @@
   </p:sldMasterIdLst>
   <p:sldIdLst>
     <p:sldId id="256" r:id="rId2"/>
-    <p:sldId id="265" r:id="rId3"/>
-    <p:sldId id="273" r:id="rId4"/>
-    <p:sldId id="274" r:id="rId5"/>
-    <p:sldId id="267" r:id="rId6"/>
-    <p:sldId id="272" r:id="rId7"/>
-    <p:sldId id="266" r:id="rId8"/>
-    <p:sldId id="261" r:id="rId9"/>
-    <p:sldId id="262" r:id="rId10"/>
-    <p:sldId id="263" r:id="rId11"/>
-    <p:sldId id="264" r:id="rId12"/>
-    <p:sldId id="268" r:id="rId13"/>
+    <p:sldId id="273" r:id="rId3"/>
+    <p:sldId id="267" r:id="rId4"/>
+    <p:sldId id="272" r:id="rId5"/>
+    <p:sldId id="266" r:id="rId6"/>
+    <p:sldId id="275" r:id="rId7"/>
+    <p:sldId id="278" r:id="rId8"/>
+    <p:sldId id="276" r:id="rId9"/>
+    <p:sldId id="279" r:id="rId10"/>
+    <p:sldId id="277" r:id="rId11"/>
+    <p:sldId id="280" r:id="rId12"/>
+    <p:sldId id="274" r:id="rId13"/>
     <p:sldId id="269" r:id="rId14"/>
     <p:sldId id="270" r:id="rId15"/>
     <p:sldId id="271" r:id="rId16"/>
@@ -3500,7 +3500,7 @@
           <p:cNvPr id="2" name="Title 1">
             <a:extLst>
               <a:ext uri="{FF2B5EF4-FFF2-40B4-BE49-F238E27FC236}">
-                <a16:creationId xmlns:a16="http://schemas.microsoft.com/office/drawing/2014/main" id="{AAF2060A-8CCC-ABE9-2A2D-724058D518E6}"/>
+                <a16:creationId xmlns:a16="http://schemas.microsoft.com/office/drawing/2014/main" id="{C859176F-C797-C025-796F-5C8F338E1CE5}"/>
               </a:ext>
             </a:extLst>
           </p:cNvPr>
@@ -3518,7 +3518,7 @@
           <a:p>
             <a:r>
               <a:rPr lang="en-IT" dirty="0"/>
-              <a:t>LPD</a:t>
+              <a:t>LPD - Theory</a:t>
             </a:r>
           </a:p>
         </p:txBody>
@@ -3528,7 +3528,7 @@
           <p:cNvPr id="3" name="Content Placeholder 2">
             <a:extLst>
               <a:ext uri="{FF2B5EF4-FFF2-40B4-BE49-F238E27FC236}">
-                <a16:creationId xmlns:a16="http://schemas.microsoft.com/office/drawing/2014/main" id="{8C482E03-3E59-5F51-C1CD-DC9FC5B2E5E7}"/>
+                <a16:creationId xmlns:a16="http://schemas.microsoft.com/office/drawing/2014/main" id="{2A69D691-26FE-837A-8189-17A0B2E4E045}"/>
               </a:ext>
             </a:extLst>
           </p:cNvPr>
@@ -3551,7 +3551,7 @@
     </p:spTree>
     <p:extLst>
       <p:ext uri="{BB962C8B-B14F-4D97-AF65-F5344CB8AC3E}">
-        <p14:creationId xmlns:p14="http://schemas.microsoft.com/office/powerpoint/2010/main" val="2324188230"/>
+        <p14:creationId xmlns:p14="http://schemas.microsoft.com/office/powerpoint/2010/main" val="868582608"/>
       </p:ext>
     </p:extLst>
   </p:cSld>
@@ -3583,7 +3583,7 @@
           <p:cNvPr id="2" name="Title 1">
             <a:extLst>
               <a:ext uri="{FF2B5EF4-FFF2-40B4-BE49-F238E27FC236}">
-                <a16:creationId xmlns:a16="http://schemas.microsoft.com/office/drawing/2014/main" id="{CF225E60-7B43-D251-41F1-36F43E596829}"/>
+                <a16:creationId xmlns:a16="http://schemas.microsoft.com/office/drawing/2014/main" id="{E815360E-B578-3FE4-8F84-5E00E564505D}"/>
               </a:ext>
             </a:extLst>
           </p:cNvPr>
@@ -3601,7 +3601,7 @@
           <a:p>
             <a:r>
               <a:rPr lang="en-IT" dirty="0"/>
-              <a:t>Implementation</a:t>
+              <a:t>LPD - Implementation</a:t>
             </a:r>
           </a:p>
         </p:txBody>
@@ -3611,7 +3611,7 @@
           <p:cNvPr id="3" name="Content Placeholder 2">
             <a:extLst>
               <a:ext uri="{FF2B5EF4-FFF2-40B4-BE49-F238E27FC236}">
-                <a16:creationId xmlns:a16="http://schemas.microsoft.com/office/drawing/2014/main" id="{131E22C8-771F-A896-8369-2C04D6DE5701}"/>
+                <a16:creationId xmlns:a16="http://schemas.microsoft.com/office/drawing/2014/main" id="{32F15E8B-F877-4EB9-EFD4-8A0F9B0A0E65}"/>
               </a:ext>
             </a:extLst>
           </p:cNvPr>
@@ -3627,14 +3627,14 @@
           <a:bodyPr/>
           <a:lstStyle/>
           <a:p>
-            <a:endParaRPr lang="en-IT" dirty="0"/>
+            <a:endParaRPr lang="en-IT"/>
           </a:p>
         </p:txBody>
       </p:sp>
     </p:spTree>
     <p:extLst>
       <p:ext uri="{BB962C8B-B14F-4D97-AF65-F5344CB8AC3E}">
-        <p14:creationId xmlns:p14="http://schemas.microsoft.com/office/powerpoint/2010/main" val="3637712704"/>
+        <p14:creationId xmlns:p14="http://schemas.microsoft.com/office/powerpoint/2010/main" val="2787496708"/>
       </p:ext>
     </p:extLst>
   </p:cSld>
@@ -3666,7 +3666,7 @@
           <p:cNvPr id="2" name="Title 1">
             <a:extLst>
               <a:ext uri="{FF2B5EF4-FFF2-40B4-BE49-F238E27FC236}">
-                <a16:creationId xmlns:a16="http://schemas.microsoft.com/office/drawing/2014/main" id="{EE11DF15-5170-D068-FBDB-D31B3B54D815}"/>
+                <a16:creationId xmlns:a16="http://schemas.microsoft.com/office/drawing/2014/main" id="{8EF848B2-E92B-2FBE-2701-589EEE9E8E3F}"/>
               </a:ext>
             </a:extLst>
           </p:cNvPr>
@@ -3677,15 +3677,23 @@
             <p:ph type="title"/>
           </p:nvPr>
         </p:nvSpPr>
-        <p:spPr/>
-        <p:txBody>
-          <a:bodyPr/>
-          <a:lstStyle/>
-          <a:p>
-            <a:r>
-              <a:rPr lang="en-IT" dirty="0"/>
-              <a:t>Introducing th experiment</a:t>
-            </a:r>
+        <p:spPr>
+          <a:xfrm>
+            <a:off x="838200" y="365125"/>
+            <a:ext cx="10515600" cy="1006475"/>
+          </a:xfrm>
+        </p:spPr>
+        <p:txBody>
+          <a:bodyPr>
+            <a:normAutofit/>
+          </a:bodyPr>
+          <a:lstStyle/>
+          <a:p>
+            <a:r>
+              <a:rPr lang="en-GB" dirty="0"/>
+              <a:t>Introducing the experiments</a:t>
+            </a:r>
+            <a:endParaRPr lang="en-IT" dirty="0"/>
           </a:p>
         </p:txBody>
       </p:sp>
@@ -3694,7 +3702,7 @@
           <p:cNvPr id="3" name="Content Placeholder 2">
             <a:extLst>
               <a:ext uri="{FF2B5EF4-FFF2-40B4-BE49-F238E27FC236}">
-                <a16:creationId xmlns:a16="http://schemas.microsoft.com/office/drawing/2014/main" id="{05AC7A7C-49C4-64F4-C9B9-8D8EE81B8F65}"/>
+                <a16:creationId xmlns:a16="http://schemas.microsoft.com/office/drawing/2014/main" id="{646DCC3C-8CA7-C249-1267-F97DE0C8A93F}"/>
               </a:ext>
             </a:extLst>
           </p:cNvPr>
@@ -3705,19 +3713,107 @@
             <p:ph idx="1"/>
           </p:nvPr>
         </p:nvSpPr>
-        <p:spPr/>
-        <p:txBody>
-          <a:bodyPr/>
-          <a:lstStyle/>
-          <a:p>
-            <a:endParaRPr lang="en-IT"/>
+        <p:spPr>
+          <a:xfrm>
+            <a:off x="838200" y="1526721"/>
+            <a:ext cx="10515600" cy="4650242"/>
+          </a:xfrm>
+        </p:spPr>
+        <p:txBody>
+          <a:bodyPr>
+            <a:normAutofit fontScale="92500" lnSpcReduction="10000"/>
+          </a:bodyPr>
+          <a:lstStyle/>
+          <a:p>
+            <a:r>
+              <a:rPr lang="en-GB" dirty="0"/>
+              <a:t>Test Geometries:</a:t>
+            </a:r>
+          </a:p>
+          <a:p>
+            <a:pPr lvl="1"/>
+            <a:r>
+              <a:rPr lang="en-GB" dirty="0"/>
+              <a:t>30 angles in [-30°, 30°]</a:t>
+            </a:r>
+          </a:p>
+          <a:p>
+            <a:pPr lvl="1"/>
+            <a:r>
+              <a:rPr lang="en-GB" dirty="0"/>
+              <a:t>30 angles in [-15°, 15°]</a:t>
+            </a:r>
+          </a:p>
+          <a:p>
+            <a:pPr lvl="1"/>
+            <a:r>
+              <a:rPr lang="en-GB" dirty="0"/>
+              <a:t>30 angles in [0°, 180°]</a:t>
+            </a:r>
+          </a:p>
+          <a:p>
+            <a:pPr lvl="1"/>
+            <a:r>
+              <a:rPr lang="en-GB" dirty="0"/>
+              <a:t>Each tested with and without noise (noise level = 0.1)</a:t>
+            </a:r>
+          </a:p>
+          <a:p>
+            <a:r>
+              <a:rPr lang="en-GB" dirty="0"/>
+              <a:t>Metrics:</a:t>
+            </a:r>
+          </a:p>
+          <a:p>
+            <a:pPr lvl="1"/>
+            <a:r>
+              <a:rPr lang="en-GB" dirty="0"/>
+              <a:t>Relative Error (RE)</a:t>
+            </a:r>
+          </a:p>
+          <a:p>
+            <a:pPr lvl="1"/>
+            <a:r>
+              <a:rPr lang="en-GB" dirty="0"/>
+              <a:t>PSNR</a:t>
+            </a:r>
+          </a:p>
+          <a:p>
+            <a:pPr lvl="1"/>
+            <a:r>
+              <a:rPr lang="en-GB" dirty="0"/>
+              <a:t>SSIM</a:t>
+            </a:r>
+          </a:p>
+          <a:p>
+            <a:r>
+              <a:rPr lang="en-GB" dirty="0"/>
+              <a:t>Outputs:</a:t>
+            </a:r>
+          </a:p>
+          <a:p>
+            <a:pPr lvl="1"/>
+            <a:r>
+              <a:rPr lang="en-GB" dirty="0"/>
+              <a:t>Reconstruction results for selected images, with zoom-in area visualizations</a:t>
+            </a:r>
+          </a:p>
+          <a:p>
+            <a:pPr lvl="1"/>
+            <a:r>
+              <a:rPr lang="en-GB" dirty="0"/>
+              <a:t>Average metrics across a subset of the test set, presented in a .xlsx file</a:t>
+            </a:r>
+          </a:p>
+          <a:p>
+            <a:endParaRPr lang="en-IT" dirty="0"/>
           </a:p>
         </p:txBody>
       </p:sp>
     </p:spTree>
     <p:extLst>
       <p:ext uri="{BB962C8B-B14F-4D97-AF65-F5344CB8AC3E}">
-        <p14:creationId xmlns:p14="http://schemas.microsoft.com/office/powerpoint/2010/main" val="214250746"/>
+        <p14:creationId xmlns:p14="http://schemas.microsoft.com/office/powerpoint/2010/main" val="2158083076"/>
       </p:ext>
     </p:extLst>
   </p:cSld>
@@ -3772,31 +3868,35 @@
           </a:p>
         </p:txBody>
       </p:sp>
-      <p:sp>
-        <p:nvSpPr>
-          <p:cNvPr id="3" name="Content Placeholder 2">
-            <a:extLst>
-              <a:ext uri="{FF2B5EF4-FFF2-40B4-BE49-F238E27FC236}">
-                <a16:creationId xmlns:a16="http://schemas.microsoft.com/office/drawing/2014/main" id="{06F1268A-68B6-F31B-CD3C-0868BF5D27A4}"/>
-              </a:ext>
-            </a:extLst>
-          </p:cNvPr>
-          <p:cNvSpPr>
-            <a:spLocks noGrp="1"/>
-          </p:cNvSpPr>
+      <p:pic>
+        <p:nvPicPr>
+          <p:cNvPr id="10" name="Content Placeholder 9" descr="A table with numbers and lines&#10;&#10;AI-generated content may be incorrect.">
+            <a:extLst>
+              <a:ext uri="{FF2B5EF4-FFF2-40B4-BE49-F238E27FC236}">
+                <a16:creationId xmlns:a16="http://schemas.microsoft.com/office/drawing/2014/main" id="{94D096F2-88F9-0214-7275-8F60DF655D20}"/>
+              </a:ext>
+            </a:extLst>
+          </p:cNvPr>
+          <p:cNvPicPr>
+            <a:picLocks noGrp="1" noChangeAspect="1"/>
+          </p:cNvPicPr>
           <p:nvPr>
             <p:ph idx="1"/>
           </p:nvPr>
-        </p:nvSpPr>
-        <p:spPr/>
-        <p:txBody>
-          <a:bodyPr/>
-          <a:lstStyle/>
-          <a:p>
-            <a:endParaRPr lang="en-IT"/>
-          </a:p>
-        </p:txBody>
-      </p:sp>
+        </p:nvPicPr>
+        <p:blipFill>
+          <a:blip r:embed="rId2"/>
+          <a:stretch>
+            <a:fillRect/>
+          </a:stretch>
+        </p:blipFill>
+        <p:spPr>
+          <a:xfrm>
+            <a:off x="143184" y="1690688"/>
+            <a:ext cx="11905632" cy="3926477"/>
+          </a:xfrm>
+        </p:spPr>
+      </p:pic>
     </p:spTree>
     <p:extLst>
       <p:ext uri="{BB962C8B-B14F-4D97-AF65-F5344CB8AC3E}">
@@ -4021,7 +4121,7 @@
           <p:cNvPr id="2" name="Title 1">
             <a:extLst>
               <a:ext uri="{FF2B5EF4-FFF2-40B4-BE49-F238E27FC236}">
-                <a16:creationId xmlns:a16="http://schemas.microsoft.com/office/drawing/2014/main" id="{65DCC78A-3028-4094-681B-FA60BB3D9ADA}"/>
+                <a16:creationId xmlns:a16="http://schemas.microsoft.com/office/drawing/2014/main" id="{22C652D9-1213-5675-2328-12A610613D94}"/>
               </a:ext>
             </a:extLst>
           </p:cNvPr>
@@ -4039,7 +4139,7 @@
           <a:p>
             <a:r>
               <a:rPr lang="en-IT" dirty="0"/>
-              <a:t>Aim of the project</a:t>
+              <a:t>Project description</a:t>
             </a:r>
           </a:p>
         </p:txBody>
@@ -4049,7 +4149,7 @@
           <p:cNvPr id="3" name="Content Placeholder 2">
             <a:extLst>
               <a:ext uri="{FF2B5EF4-FFF2-40B4-BE49-F238E27FC236}">
-                <a16:creationId xmlns:a16="http://schemas.microsoft.com/office/drawing/2014/main" id="{121FDFEF-D0CF-145F-B0CD-4D5DE9706E2E}"/>
+                <a16:creationId xmlns:a16="http://schemas.microsoft.com/office/drawing/2014/main" id="{17665B30-47E5-CAAD-7B1E-F73716D257F1}"/>
               </a:ext>
             </a:extLst>
           </p:cNvPr>
@@ -4066,15 +4166,78 @@
           <a:lstStyle/>
           <a:p>
             <a:r>
+              <a:rPr lang="en-GB" b="1" dirty="0"/>
+              <a:t>Objective</a:t>
+            </a:r>
+            <a:r>
               <a:rPr lang="en-GB" dirty="0"/>
-              <a:t>The goal of this project is to apply an unrolling-type algorithm for the reconstruction of limited angle tomographic images and to compare the results with model-based algorithms using Total Variation regularization.</a:t>
-            </a:r>
-            <a:endParaRPr lang="en-IT" dirty="0"/>
-          </a:p>
-          <a:p>
-            <a:pPr marL="0" indent="0">
-              <a:buNone/>
-            </a:pPr>
+              <a:t>: Reconstruct CT images from limited-angle sinograms using an </a:t>
+            </a:r>
+            <a:r>
+              <a:rPr lang="en-GB" b="1" dirty="0"/>
+              <a:t>unrolling method</a:t>
+            </a:r>
+            <a:r>
+              <a:rPr lang="en-GB" dirty="0"/>
+              <a:t> (Adler et al.) with a </a:t>
+            </a:r>
+            <a:r>
+              <a:rPr lang="en-GB" b="1" dirty="0"/>
+              <a:t>Residual U-Net</a:t>
+            </a:r>
+            <a:r>
+              <a:rPr lang="en-GB" dirty="0"/>
+              <a:t> architecture.</a:t>
+            </a:r>
+          </a:p>
+          <a:p>
+            <a:r>
+              <a:rPr lang="en-GB" b="1" dirty="0"/>
+              <a:t>Comparison</a:t>
+            </a:r>
+            <a:r>
+              <a:rPr lang="en-GB" dirty="0"/>
+              <a:t>: Evaluate the unrolling </a:t>
+            </a:r>
+            <a:r>
+              <a:rPr lang="en-GB" b="1" dirty="0"/>
+              <a:t>Plug-and-Play</a:t>
+            </a:r>
+            <a:r>
+              <a:rPr lang="en-GB" dirty="0"/>
+              <a:t> algorithm against a </a:t>
+            </a:r>
+            <a:r>
+              <a:rPr lang="en-GB" b="1" dirty="0"/>
+              <a:t>Total Variation (TV)</a:t>
+            </a:r>
+            <a:r>
+              <a:rPr lang="en-GB" dirty="0"/>
+              <a:t> model-based reconstruction.</a:t>
+            </a:r>
+          </a:p>
+          <a:p>
+            <a:r>
+              <a:rPr lang="en-GB" b="1" dirty="0"/>
+              <a:t>Dataset</a:t>
+            </a:r>
+            <a:r>
+              <a:rPr lang="en-GB" dirty="0"/>
+              <a:t>: </a:t>
+            </a:r>
+            <a:r>
+              <a:rPr lang="en-GB" b="1" dirty="0"/>
+              <a:t>Mayo Clinic CT Dataset</a:t>
+            </a:r>
+            <a:br>
+              <a:rPr lang="en-GB" dirty="0"/>
+            </a:br>
+            <a:r>
+              <a:rPr lang="en-GB" dirty="0"/>
+              <a:t>Link</a:t>
+            </a:r>
+          </a:p>
+          <a:p>
             <a:endParaRPr lang="en-IT" dirty="0"/>
           </a:p>
         </p:txBody>
@@ -4082,7 +4245,7 @@
     </p:spTree>
     <p:extLst>
       <p:ext uri="{BB962C8B-B14F-4D97-AF65-F5344CB8AC3E}">
-        <p14:creationId xmlns:p14="http://schemas.microsoft.com/office/powerpoint/2010/main" val="3973393454"/>
+        <p14:creationId xmlns:p14="http://schemas.microsoft.com/office/powerpoint/2010/main" val="3642318241"/>
       </p:ext>
     </p:extLst>
   </p:cSld>
@@ -4114,7 +4277,7 @@
           <p:cNvPr id="2" name="Title 1">
             <a:extLst>
               <a:ext uri="{FF2B5EF4-FFF2-40B4-BE49-F238E27FC236}">
-                <a16:creationId xmlns:a16="http://schemas.microsoft.com/office/drawing/2014/main" id="{22C652D9-1213-5675-2328-12A610613D94}"/>
+                <a16:creationId xmlns:a16="http://schemas.microsoft.com/office/drawing/2014/main" id="{463732BD-0D18-D5BE-51F1-37046E9EA08F}"/>
               </a:ext>
             </a:extLst>
           </p:cNvPr>
@@ -4125,338 +4288,12 @@
             <p:ph type="title"/>
           </p:nvPr>
         </p:nvSpPr>
-        <p:spPr/>
-        <p:txBody>
-          <a:bodyPr/>
-          <a:lstStyle/>
-          <a:p>
-            <a:r>
-              <a:rPr lang="en-IT" dirty="0"/>
-              <a:t>Project description</a:t>
-            </a:r>
-          </a:p>
-        </p:txBody>
-      </p:sp>
-      <p:sp>
-        <p:nvSpPr>
-          <p:cNvPr id="3" name="Content Placeholder 2">
-            <a:extLst>
-              <a:ext uri="{FF2B5EF4-FFF2-40B4-BE49-F238E27FC236}">
-                <a16:creationId xmlns:a16="http://schemas.microsoft.com/office/drawing/2014/main" id="{17665B30-47E5-CAAD-7B1E-F73716D257F1}"/>
-              </a:ext>
-            </a:extLst>
-          </p:cNvPr>
-          <p:cNvSpPr>
-            <a:spLocks noGrp="1"/>
-          </p:cNvSpPr>
-          <p:nvPr>
-            <p:ph idx="1"/>
-          </p:nvPr>
-        </p:nvSpPr>
-        <p:spPr/>
-        <p:txBody>
-          <a:bodyPr/>
-          <a:lstStyle/>
-          <a:p>
-            <a:r>
-              <a:rPr lang="en-GB" b="1" dirty="0"/>
-              <a:t>Objective</a:t>
-            </a:r>
-            <a:r>
-              <a:rPr lang="en-GB" dirty="0"/>
-              <a:t>: Reconstruct CT images from limited-angle sinograms using an </a:t>
-            </a:r>
-            <a:r>
-              <a:rPr lang="en-GB" b="1" dirty="0"/>
-              <a:t>unrolling method</a:t>
-            </a:r>
-            <a:r>
-              <a:rPr lang="en-GB" dirty="0"/>
-              <a:t> (Adler et al.) with a </a:t>
-            </a:r>
-            <a:r>
-              <a:rPr lang="en-GB" b="1" dirty="0"/>
-              <a:t>Residual U-Net</a:t>
-            </a:r>
-            <a:r>
-              <a:rPr lang="en-GB" dirty="0"/>
-              <a:t> architecture.</a:t>
-            </a:r>
-          </a:p>
-          <a:p>
-            <a:r>
-              <a:rPr lang="en-GB" b="1" dirty="0"/>
-              <a:t>Comparison</a:t>
-            </a:r>
-            <a:r>
-              <a:rPr lang="en-GB" dirty="0"/>
-              <a:t>: Evaluate the unrolling </a:t>
-            </a:r>
-            <a:r>
-              <a:rPr lang="en-GB" b="1" dirty="0"/>
-              <a:t>Plug-and-Play</a:t>
-            </a:r>
-            <a:r>
-              <a:rPr lang="en-GB" dirty="0"/>
-              <a:t> algorithm against a </a:t>
-            </a:r>
-            <a:r>
-              <a:rPr lang="en-GB" b="1" dirty="0"/>
-              <a:t>Total Variation (TV)</a:t>
-            </a:r>
-            <a:r>
-              <a:rPr lang="en-GB" dirty="0"/>
-              <a:t> model-based reconstruction.</a:t>
-            </a:r>
-          </a:p>
-          <a:p>
-            <a:r>
-              <a:rPr lang="en-GB" b="1" dirty="0"/>
-              <a:t>Dataset</a:t>
-            </a:r>
-            <a:r>
-              <a:rPr lang="en-GB" dirty="0"/>
-              <a:t>: </a:t>
-            </a:r>
-            <a:r>
-              <a:rPr lang="en-GB" b="1" dirty="0"/>
-              <a:t>Mayo Clinic CT Dataset</a:t>
-            </a:r>
-            <a:br>
-              <a:rPr lang="en-GB" dirty="0"/>
-            </a:br>
-            <a:r>
-              <a:rPr lang="en-GB" dirty="0"/>
-              <a:t>Link</a:t>
-            </a:r>
-          </a:p>
-          <a:p>
-            <a:endParaRPr lang="en-IT" dirty="0"/>
-          </a:p>
-        </p:txBody>
-      </p:sp>
-    </p:spTree>
-    <p:extLst>
-      <p:ext uri="{BB962C8B-B14F-4D97-AF65-F5344CB8AC3E}">
-        <p14:creationId xmlns:p14="http://schemas.microsoft.com/office/powerpoint/2010/main" val="3642318241"/>
-      </p:ext>
-    </p:extLst>
-  </p:cSld>
-  <p:clrMapOvr>
-    <a:masterClrMapping/>
-  </p:clrMapOvr>
-</p:sld>
-</file>
-
-<file path=ppt/slides/slide4.xml><?xml version="1.0" encoding="utf-8"?>
-<p:sld xmlns:a="http://schemas.openxmlformats.org/drawingml/2006/main" xmlns:r="http://schemas.openxmlformats.org/officeDocument/2006/relationships" xmlns:p="http://schemas.openxmlformats.org/presentationml/2006/main">
-  <p:cSld>
-    <p:spTree>
-      <p:nvGrpSpPr>
-        <p:cNvPr id="1" name=""/>
-        <p:cNvGrpSpPr/>
-        <p:nvPr/>
-      </p:nvGrpSpPr>
-      <p:grpSpPr>
-        <a:xfrm>
-          <a:off x="0" y="0"/>
-          <a:ext cx="0" cy="0"/>
-          <a:chOff x="0" y="0"/>
-          <a:chExt cx="0" cy="0"/>
-        </a:xfrm>
-      </p:grpSpPr>
-      <p:sp>
-        <p:nvSpPr>
-          <p:cNvPr id="2" name="Title 1">
-            <a:extLst>
-              <a:ext uri="{FF2B5EF4-FFF2-40B4-BE49-F238E27FC236}">
-                <a16:creationId xmlns:a16="http://schemas.microsoft.com/office/drawing/2014/main" id="{8EF848B2-E92B-2FBE-2701-589EEE9E8E3F}"/>
-              </a:ext>
-            </a:extLst>
-          </p:cNvPr>
-          <p:cNvSpPr>
-            <a:spLocks noGrp="1"/>
-          </p:cNvSpPr>
-          <p:nvPr>
-            <p:ph type="title"/>
-          </p:nvPr>
-        </p:nvSpPr>
-        <p:spPr/>
-        <p:txBody>
-          <a:bodyPr/>
-          <a:lstStyle/>
-          <a:p>
-            <a:r>
-              <a:rPr lang="en-GB" dirty="0"/>
-              <a:t>Experiments &amp; Evaluation</a:t>
-            </a:r>
-            <a:br>
-              <a:rPr lang="en-GB" dirty="0"/>
-            </a:br>
-            <a:endParaRPr lang="en-IT" dirty="0"/>
-          </a:p>
-        </p:txBody>
-      </p:sp>
-      <p:sp>
-        <p:nvSpPr>
-          <p:cNvPr id="3" name="Content Placeholder 2">
-            <a:extLst>
-              <a:ext uri="{FF2B5EF4-FFF2-40B4-BE49-F238E27FC236}">
-                <a16:creationId xmlns:a16="http://schemas.microsoft.com/office/drawing/2014/main" id="{646DCC3C-8CA7-C249-1267-F97DE0C8A93F}"/>
-              </a:ext>
-            </a:extLst>
-          </p:cNvPr>
-          <p:cNvSpPr>
-            <a:spLocks noGrp="1"/>
-          </p:cNvSpPr>
-          <p:nvPr>
-            <p:ph idx="1"/>
-          </p:nvPr>
-        </p:nvSpPr>
-        <p:spPr/>
-        <p:txBody>
-          <a:bodyPr>
-            <a:normAutofit fontScale="92500" lnSpcReduction="10000"/>
-          </a:bodyPr>
-          <a:lstStyle/>
-          <a:p>
-            <a:r>
-              <a:rPr lang="en-GB" dirty="0"/>
-              <a:t>Test Geometries:</a:t>
-            </a:r>
-          </a:p>
-          <a:p>
-            <a:pPr lvl="1"/>
-            <a:r>
-              <a:rPr lang="en-GB" dirty="0"/>
-              <a:t>30 angles in [-30°, 30°]</a:t>
-            </a:r>
-          </a:p>
-          <a:p>
-            <a:pPr lvl="1"/>
-            <a:r>
-              <a:rPr lang="en-GB" dirty="0"/>
-              <a:t>30 angles in [-15°, 15°]</a:t>
-            </a:r>
-          </a:p>
-          <a:p>
-            <a:pPr lvl="1"/>
-            <a:r>
-              <a:rPr lang="en-GB" dirty="0"/>
-              <a:t>30 angles in [0°, 180°]</a:t>
-            </a:r>
-          </a:p>
-          <a:p>
-            <a:pPr lvl="1"/>
-            <a:r>
-              <a:rPr lang="en-GB" dirty="0"/>
-              <a:t>Each tested with and without noise (noise level </a:t>
-            </a:r>
-            <a:r>
-              <a:rPr lang="en-GB"/>
-              <a:t>= 0.1)</a:t>
-            </a:r>
-            <a:endParaRPr lang="en-GB" dirty="0"/>
-          </a:p>
-          <a:p>
-            <a:r>
-              <a:rPr lang="en-GB" dirty="0"/>
-              <a:t>Metrics:</a:t>
-            </a:r>
-          </a:p>
-          <a:p>
-            <a:pPr lvl="1"/>
-            <a:r>
-              <a:rPr lang="en-GB" dirty="0"/>
-              <a:t>Relative Error (RE)</a:t>
-            </a:r>
-          </a:p>
-          <a:p>
-            <a:pPr lvl="1"/>
-            <a:r>
-              <a:rPr lang="en-GB" dirty="0"/>
-              <a:t>PSNR</a:t>
-            </a:r>
-          </a:p>
-          <a:p>
-            <a:pPr lvl="1"/>
-            <a:r>
-              <a:rPr lang="en-GB" dirty="0"/>
-              <a:t>SSIM</a:t>
-            </a:r>
-          </a:p>
-          <a:p>
-            <a:r>
-              <a:rPr lang="en-GB" dirty="0"/>
-              <a:t>Outputs:</a:t>
-            </a:r>
-          </a:p>
-          <a:p>
-            <a:pPr lvl="1"/>
-            <a:r>
-              <a:rPr lang="en-GB" dirty="0"/>
-              <a:t>Reconstruction results for a selected image, with zoom-in visualizations</a:t>
-            </a:r>
-          </a:p>
-          <a:p>
-            <a:pPr lvl="1"/>
-            <a:r>
-              <a:rPr lang="en-GB" dirty="0"/>
-              <a:t>Average metrics across the entire test set, presented in a table</a:t>
-            </a:r>
-          </a:p>
-          <a:p>
-            <a:endParaRPr lang="en-IT" dirty="0"/>
-          </a:p>
-        </p:txBody>
-      </p:sp>
-    </p:spTree>
-    <p:extLst>
-      <p:ext uri="{BB962C8B-B14F-4D97-AF65-F5344CB8AC3E}">
-        <p14:creationId xmlns:p14="http://schemas.microsoft.com/office/powerpoint/2010/main" val="2158083076"/>
-      </p:ext>
-    </p:extLst>
-  </p:cSld>
-  <p:clrMapOvr>
-    <a:masterClrMapping/>
-  </p:clrMapOvr>
-</p:sld>
-</file>
-
-<file path=ppt/slides/slide5.xml><?xml version="1.0" encoding="utf-8"?>
-<p:sld xmlns:a="http://schemas.openxmlformats.org/drawingml/2006/main" xmlns:r="http://schemas.openxmlformats.org/officeDocument/2006/relationships" xmlns:p="http://schemas.openxmlformats.org/presentationml/2006/main">
-  <p:cSld>
-    <p:spTree>
-      <p:nvGrpSpPr>
-        <p:cNvPr id="1" name=""/>
-        <p:cNvGrpSpPr/>
-        <p:nvPr/>
-      </p:nvGrpSpPr>
-      <p:grpSpPr>
-        <a:xfrm>
-          <a:off x="0" y="0"/>
-          <a:ext cx="0" cy="0"/>
-          <a:chOff x="0" y="0"/>
-          <a:chExt cx="0" cy="0"/>
-        </a:xfrm>
-      </p:grpSpPr>
-      <p:sp>
-        <p:nvSpPr>
-          <p:cNvPr id="2" name="Title 1">
-            <a:extLst>
-              <a:ext uri="{FF2B5EF4-FFF2-40B4-BE49-F238E27FC236}">
-                <a16:creationId xmlns:a16="http://schemas.microsoft.com/office/drawing/2014/main" id="{463732BD-0D18-D5BE-51F1-37046E9EA08F}"/>
-              </a:ext>
-            </a:extLst>
-          </p:cNvPr>
-          <p:cNvSpPr>
-            <a:spLocks noGrp="1"/>
-          </p:cNvSpPr>
-          <p:nvPr>
-            <p:ph type="title"/>
-          </p:nvPr>
-        </p:nvSpPr>
-        <p:spPr/>
+        <p:spPr>
+          <a:xfrm>
+            <a:off x="838200" y="365125"/>
+            <a:ext cx="10515600" cy="706947"/>
+          </a:xfrm>
+        </p:spPr>
         <p:txBody>
           <a:bodyPr/>
           <a:lstStyle/>
@@ -4600,7 +4437,7 @@
 </p:sld>
 </file>
 
-<file path=ppt/slides/slide6.xml><?xml version="1.0" encoding="utf-8"?>
+<file path=ppt/slides/slide4.xml><?xml version="1.0" encoding="utf-8"?>
 <p:sld xmlns:a="http://schemas.openxmlformats.org/drawingml/2006/main" xmlns:r="http://schemas.openxmlformats.org/officeDocument/2006/relationships" xmlns:p="http://schemas.openxmlformats.org/presentationml/2006/main">
   <p:cSld>
     <p:spTree>
@@ -4633,7 +4470,12 @@
             <p:ph type="title"/>
           </p:nvPr>
         </p:nvSpPr>
-        <p:spPr/>
+        <p:spPr>
+          <a:xfrm>
+            <a:off x="838200" y="365125"/>
+            <a:ext cx="10515600" cy="777875"/>
+          </a:xfrm>
+        </p:spPr>
         <p:txBody>
           <a:bodyPr/>
           <a:lstStyle/>
@@ -4696,8 +4538,8 @@
         </p:blipFill>
         <p:spPr>
           <a:xfrm>
-            <a:off x="1050978" y="5191157"/>
-            <a:ext cx="3472036" cy="757535"/>
+            <a:off x="1050977" y="5191157"/>
+            <a:ext cx="5132583" cy="1119836"/>
           </a:xfrm>
           <a:prstGeom prst="rect">
             <a:avLst/>
@@ -4747,6 +4589,212 @@
 </p:sld>
 </file>
 
+<file path=ppt/slides/slide5.xml><?xml version="1.0" encoding="utf-8"?>
+<p:sld xmlns:a="http://schemas.openxmlformats.org/drawingml/2006/main" xmlns:r="http://schemas.openxmlformats.org/officeDocument/2006/relationships" xmlns:p="http://schemas.openxmlformats.org/presentationml/2006/main">
+  <p:cSld>
+    <p:spTree>
+      <p:nvGrpSpPr>
+        <p:cNvPr id="1" name=""/>
+        <p:cNvGrpSpPr/>
+        <p:nvPr/>
+      </p:nvGrpSpPr>
+      <p:grpSpPr>
+        <a:xfrm>
+          <a:off x="0" y="0"/>
+          <a:ext cx="0" cy="0"/>
+          <a:chOff x="0" y="0"/>
+          <a:chExt cx="0" cy="0"/>
+        </a:xfrm>
+      </p:grpSpPr>
+      <p:sp>
+        <p:nvSpPr>
+          <p:cNvPr id="2" name="Title 1">
+            <a:extLst>
+              <a:ext uri="{FF2B5EF4-FFF2-40B4-BE49-F238E27FC236}">
+                <a16:creationId xmlns:a16="http://schemas.microsoft.com/office/drawing/2014/main" id="{D85CC501-57C5-D194-0730-28020372C971}"/>
+              </a:ext>
+            </a:extLst>
+          </p:cNvPr>
+          <p:cNvSpPr>
+            <a:spLocks noGrp="1"/>
+          </p:cNvSpPr>
+          <p:nvPr>
+            <p:ph type="title"/>
+          </p:nvPr>
+        </p:nvSpPr>
+        <p:spPr/>
+        <p:txBody>
+          <a:bodyPr/>
+          <a:lstStyle/>
+          <a:p>
+            <a:r>
+              <a:rPr lang="en-IT" dirty="0"/>
+              <a:t>Methodology</a:t>
+            </a:r>
+          </a:p>
+        </p:txBody>
+      </p:sp>
+      <p:sp>
+        <p:nvSpPr>
+          <p:cNvPr id="3" name="Content Placeholder 2">
+            <a:extLst>
+              <a:ext uri="{FF2B5EF4-FFF2-40B4-BE49-F238E27FC236}">
+                <a16:creationId xmlns:a16="http://schemas.microsoft.com/office/drawing/2014/main" id="{2B248139-9379-EF91-60B9-C4542E2FFD61}"/>
+              </a:ext>
+            </a:extLst>
+          </p:cNvPr>
+          <p:cNvSpPr>
+            <a:spLocks noGrp="1"/>
+          </p:cNvSpPr>
+          <p:nvPr>
+            <p:ph idx="1"/>
+          </p:nvPr>
+        </p:nvSpPr>
+        <p:spPr/>
+        <p:txBody>
+          <a:bodyPr/>
+          <a:lstStyle/>
+          <a:p>
+            <a:r>
+              <a:rPr lang="en-IT" dirty="0"/>
+              <a:t>We have compared 3 algorithms:</a:t>
+            </a:r>
+          </a:p>
+          <a:p>
+            <a:pPr marL="342900" indent="-342900">
+              <a:buFontTx/>
+              <a:buChar char="-"/>
+            </a:pPr>
+            <a:r>
+              <a:rPr lang="en-IT" dirty="0"/>
+              <a:t>Filtered Back Projection.</a:t>
+            </a:r>
+          </a:p>
+          <a:p>
+            <a:pPr marL="342900" indent="-342900">
+              <a:buFontTx/>
+              <a:buChar char="-"/>
+            </a:pPr>
+            <a:r>
+              <a:rPr lang="en-GB" dirty="0"/>
+              <a:t>Total Variation regularization. </a:t>
+            </a:r>
+          </a:p>
+          <a:p>
+            <a:pPr marL="342900" indent="-342900">
+              <a:buFontTx/>
+              <a:buChar char="-"/>
+            </a:pPr>
+            <a:r>
+              <a:rPr lang="en-GB" dirty="0"/>
+              <a:t>The unrolled method: </a:t>
+            </a:r>
+            <a:r>
+              <a:rPr lang="en-IT" dirty="0"/>
+              <a:t>Learned-Primal dual.</a:t>
+            </a:r>
+          </a:p>
+          <a:p>
+            <a:endParaRPr lang="en-IT" dirty="0"/>
+          </a:p>
+        </p:txBody>
+      </p:sp>
+    </p:spTree>
+    <p:extLst>
+      <p:ext uri="{BB962C8B-B14F-4D97-AF65-F5344CB8AC3E}">
+        <p14:creationId xmlns:p14="http://schemas.microsoft.com/office/powerpoint/2010/main" val="2589828621"/>
+      </p:ext>
+    </p:extLst>
+  </p:cSld>
+  <p:clrMapOvr>
+    <a:masterClrMapping/>
+  </p:clrMapOvr>
+</p:sld>
+</file>
+
+<file path=ppt/slides/slide6.xml><?xml version="1.0" encoding="utf-8"?>
+<p:sld xmlns:a="http://schemas.openxmlformats.org/drawingml/2006/main" xmlns:r="http://schemas.openxmlformats.org/officeDocument/2006/relationships" xmlns:p="http://schemas.openxmlformats.org/presentationml/2006/main">
+  <p:cSld>
+    <p:spTree>
+      <p:nvGrpSpPr>
+        <p:cNvPr id="1" name=""/>
+        <p:cNvGrpSpPr/>
+        <p:nvPr/>
+      </p:nvGrpSpPr>
+      <p:grpSpPr>
+        <a:xfrm>
+          <a:off x="0" y="0"/>
+          <a:ext cx="0" cy="0"/>
+          <a:chOff x="0" y="0"/>
+          <a:chExt cx="0" cy="0"/>
+        </a:xfrm>
+      </p:grpSpPr>
+      <p:sp>
+        <p:nvSpPr>
+          <p:cNvPr id="2" name="Title 1">
+            <a:extLst>
+              <a:ext uri="{FF2B5EF4-FFF2-40B4-BE49-F238E27FC236}">
+                <a16:creationId xmlns:a16="http://schemas.microsoft.com/office/drawing/2014/main" id="{2713CEA2-8524-8356-C672-9162F66EC677}"/>
+              </a:ext>
+            </a:extLst>
+          </p:cNvPr>
+          <p:cNvSpPr>
+            <a:spLocks noGrp="1"/>
+          </p:cNvSpPr>
+          <p:nvPr>
+            <p:ph type="title"/>
+          </p:nvPr>
+        </p:nvSpPr>
+        <p:spPr/>
+        <p:txBody>
+          <a:bodyPr/>
+          <a:lstStyle/>
+          <a:p>
+            <a:r>
+              <a:rPr lang="en-IT" dirty="0"/>
+              <a:t>FBP - Theory</a:t>
+            </a:r>
+          </a:p>
+        </p:txBody>
+      </p:sp>
+      <p:sp>
+        <p:nvSpPr>
+          <p:cNvPr id="3" name="Content Placeholder 2">
+            <a:extLst>
+              <a:ext uri="{FF2B5EF4-FFF2-40B4-BE49-F238E27FC236}">
+                <a16:creationId xmlns:a16="http://schemas.microsoft.com/office/drawing/2014/main" id="{8B22A249-345C-9196-B259-38836204DF30}"/>
+              </a:ext>
+            </a:extLst>
+          </p:cNvPr>
+          <p:cNvSpPr>
+            <a:spLocks noGrp="1"/>
+          </p:cNvSpPr>
+          <p:nvPr>
+            <p:ph idx="1"/>
+          </p:nvPr>
+        </p:nvSpPr>
+        <p:spPr/>
+        <p:txBody>
+          <a:bodyPr/>
+          <a:lstStyle/>
+          <a:p>
+            <a:endParaRPr lang="en-IT" dirty="0"/>
+          </a:p>
+        </p:txBody>
+      </p:sp>
+    </p:spTree>
+    <p:extLst>
+      <p:ext uri="{BB962C8B-B14F-4D97-AF65-F5344CB8AC3E}">
+        <p14:creationId xmlns:p14="http://schemas.microsoft.com/office/powerpoint/2010/main" val="1719156472"/>
+      </p:ext>
+    </p:extLst>
+  </p:cSld>
+  <p:clrMapOvr>
+    <a:masterClrMapping/>
+  </p:clrMapOvr>
+</p:sld>
+</file>
+
 <file path=ppt/slides/slide7.xml><?xml version="1.0" encoding="utf-8"?>
 <p:sld xmlns:a="http://schemas.openxmlformats.org/drawingml/2006/main" xmlns:r="http://schemas.openxmlformats.org/officeDocument/2006/relationships" xmlns:p="http://schemas.openxmlformats.org/presentationml/2006/main">
   <p:cSld>
@@ -4769,7 +4817,7 @@
           <p:cNvPr id="2" name="Title 1">
             <a:extLst>
               <a:ext uri="{FF2B5EF4-FFF2-40B4-BE49-F238E27FC236}">
-                <a16:creationId xmlns:a16="http://schemas.microsoft.com/office/drawing/2014/main" id="{D85CC501-57C5-D194-0730-28020372C971}"/>
+                <a16:creationId xmlns:a16="http://schemas.microsoft.com/office/drawing/2014/main" id="{5AB6DCE9-E627-9062-A7DC-EEC4B5557411}"/>
               </a:ext>
             </a:extLst>
           </p:cNvPr>
@@ -4787,7 +4835,7 @@
           <a:p>
             <a:r>
               <a:rPr lang="en-IT" dirty="0"/>
-              <a:t>Methodology</a:t>
+              <a:t>FBP - Implementation</a:t>
             </a:r>
           </a:p>
         </p:txBody>
@@ -4797,7 +4845,7 @@
           <p:cNvPr id="3" name="Content Placeholder 2">
             <a:extLst>
               <a:ext uri="{FF2B5EF4-FFF2-40B4-BE49-F238E27FC236}">
-                <a16:creationId xmlns:a16="http://schemas.microsoft.com/office/drawing/2014/main" id="{2B248139-9379-EF91-60B9-C4542E2FFD61}"/>
+                <a16:creationId xmlns:a16="http://schemas.microsoft.com/office/drawing/2014/main" id="{A802A977-6B43-D5EA-D7D3-6DCB3D3E9364}"/>
               </a:ext>
             </a:extLst>
           </p:cNvPr>
@@ -4812,46 +4860,6 @@
         <p:txBody>
           <a:bodyPr/>
           <a:lstStyle/>
-          <a:p>
-            <a:r>
-              <a:rPr lang="en-IT" dirty="0"/>
-              <a:t>We have compared 3 algorithms:</a:t>
-            </a:r>
-          </a:p>
-          <a:p>
-            <a:pPr marL="342900" indent="-342900">
-              <a:buFontTx/>
-              <a:buChar char="-"/>
-            </a:pPr>
-            <a:r>
-              <a:rPr lang="en-IT" dirty="0"/>
-              <a:t>Filtered Back Projection.</a:t>
-            </a:r>
-          </a:p>
-          <a:p>
-            <a:pPr marL="342900" indent="-342900">
-              <a:buFontTx/>
-              <a:buChar char="-"/>
-            </a:pPr>
-            <a:r>
-              <a:rPr lang="en-GB" dirty="0"/>
-              <a:t>Total Variation regularization. </a:t>
-            </a:r>
-          </a:p>
-          <a:p>
-            <a:pPr marL="342900" indent="-342900">
-              <a:buFontTx/>
-              <a:buChar char="-"/>
-            </a:pPr>
-            <a:r>
-              <a:rPr lang="en-GB" dirty="0"/>
-              <a:t>The unrolled method: </a:t>
-            </a:r>
-            <a:r>
-              <a:rPr lang="en-IT" dirty="0"/>
-              <a:t>Learned-Primal dual.</a:t>
-            </a:r>
-          </a:p>
           <a:p>
             <a:endParaRPr lang="en-IT" dirty="0"/>
           </a:p>
@@ -4860,7 +4868,7 @@
     </p:spTree>
     <p:extLst>
       <p:ext uri="{BB962C8B-B14F-4D97-AF65-F5344CB8AC3E}">
-        <p14:creationId xmlns:p14="http://schemas.microsoft.com/office/powerpoint/2010/main" val="2589828621"/>
+        <p14:creationId xmlns:p14="http://schemas.microsoft.com/office/powerpoint/2010/main" val="2812220984"/>
       </p:ext>
     </p:extLst>
   </p:cSld>
@@ -4892,7 +4900,7 @@
           <p:cNvPr id="2" name="Title 1">
             <a:extLst>
               <a:ext uri="{FF2B5EF4-FFF2-40B4-BE49-F238E27FC236}">
-                <a16:creationId xmlns:a16="http://schemas.microsoft.com/office/drawing/2014/main" id="{9E87FF6D-2621-0D41-6CA8-156B7E5829C7}"/>
+                <a16:creationId xmlns:a16="http://schemas.microsoft.com/office/drawing/2014/main" id="{4AF81308-871B-E50D-7539-BBD4B6835655}"/>
               </a:ext>
             </a:extLst>
           </p:cNvPr>
@@ -4910,7 +4918,7 @@
           <a:p>
             <a:r>
               <a:rPr lang="en-IT" dirty="0"/>
-              <a:t>FBP</a:t>
+              <a:t>TV - Theory</a:t>
             </a:r>
           </a:p>
         </p:txBody>
@@ -4920,7 +4928,7 @@
           <p:cNvPr id="3" name="Content Placeholder 2">
             <a:extLst>
               <a:ext uri="{FF2B5EF4-FFF2-40B4-BE49-F238E27FC236}">
-                <a16:creationId xmlns:a16="http://schemas.microsoft.com/office/drawing/2014/main" id="{1AC3796C-3EC3-D3EB-A2FB-602355A824AB}"/>
+                <a16:creationId xmlns:a16="http://schemas.microsoft.com/office/drawing/2014/main" id="{6E366719-2281-39CC-B298-F1C4FBC87987}"/>
               </a:ext>
             </a:extLst>
           </p:cNvPr>
@@ -4936,14 +4944,14 @@
           <a:bodyPr/>
           <a:lstStyle/>
           <a:p>
-            <a:endParaRPr lang="en-IT" dirty="0"/>
+            <a:endParaRPr lang="en-IT"/>
           </a:p>
         </p:txBody>
       </p:sp>
     </p:spTree>
     <p:extLst>
       <p:ext uri="{BB962C8B-B14F-4D97-AF65-F5344CB8AC3E}">
-        <p14:creationId xmlns:p14="http://schemas.microsoft.com/office/powerpoint/2010/main" val="233000661"/>
+        <p14:creationId xmlns:p14="http://schemas.microsoft.com/office/powerpoint/2010/main" val="2702827532"/>
       </p:ext>
     </p:extLst>
   </p:cSld>
@@ -4975,7 +4983,7 @@
           <p:cNvPr id="2" name="Title 1">
             <a:extLst>
               <a:ext uri="{FF2B5EF4-FFF2-40B4-BE49-F238E27FC236}">
-                <a16:creationId xmlns:a16="http://schemas.microsoft.com/office/drawing/2014/main" id="{43234125-6159-3A57-1743-7DE8F1B42885}"/>
+                <a16:creationId xmlns:a16="http://schemas.microsoft.com/office/drawing/2014/main" id="{B1F6B15D-568D-078C-F258-18E8FDB20CBA}"/>
               </a:ext>
             </a:extLst>
           </p:cNvPr>
@@ -4993,7 +5001,7 @@
           <a:p>
             <a:r>
               <a:rPr lang="en-IT" dirty="0"/>
-              <a:t>TV</a:t>
+              <a:t>TV - Implementation</a:t>
             </a:r>
           </a:p>
         </p:txBody>
@@ -5003,7 +5011,7 @@
           <p:cNvPr id="3" name="Content Placeholder 2">
             <a:extLst>
               <a:ext uri="{FF2B5EF4-FFF2-40B4-BE49-F238E27FC236}">
-                <a16:creationId xmlns:a16="http://schemas.microsoft.com/office/drawing/2014/main" id="{8C49FA48-5514-1061-1F54-398ED610C654}"/>
+                <a16:creationId xmlns:a16="http://schemas.microsoft.com/office/drawing/2014/main" id="{060C8BD8-139C-5A0F-7F6B-36F09E4DC356}"/>
               </a:ext>
             </a:extLst>
           </p:cNvPr>
@@ -5026,7 +5034,7 @@
     </p:spTree>
     <p:extLst>
       <p:ext uri="{BB962C8B-B14F-4D97-AF65-F5344CB8AC3E}">
-        <p14:creationId xmlns:p14="http://schemas.microsoft.com/office/powerpoint/2010/main" val="3042115714"/>
+        <p14:creationId xmlns:p14="http://schemas.microsoft.com/office/powerpoint/2010/main" val="2920419704"/>
       </p:ext>
     </p:extLst>
   </p:cSld>

</xml_diff>